<commit_message>
Added 2 more implementation slides to the presentation
</commit_message>
<xml_diff>
--- a/Sentinel.pptx
+++ b/Sentinel.pptx
@@ -14,8 +14,9 @@
     <p:sldId id="265" r:id="rId8"/>
     <p:sldId id="269" r:id="rId9"/>
     <p:sldId id="267" r:id="rId10"/>
-    <p:sldId id="270" r:id="rId11"/>
-    <p:sldId id="271" r:id="rId12"/>
+    <p:sldId id="272" r:id="rId11"/>
+    <p:sldId id="270" r:id="rId12"/>
+    <p:sldId id="271" r:id="rId13"/>
   </p:sldIdLst>
   <p:sldSz cx="12192000" cy="6858000"/>
   <p:notesSz cx="6858000" cy="9144000"/>
@@ -114,6 +115,11 @@
       </a:defRPr>
     </a:lvl9pPr>
   </p:defaultTextStyle>
+  <p:extLst>
+    <p:ext uri="{EFAFB233-063F-42B5-8137-9DF3F51BA10A}">
+      <p15:sldGuideLst xmlns:p15="http://schemas.microsoft.com/office/powerpoint/2012/main"/>
+    </p:ext>
+  </p:extLst>
 </p:presentation>
 </file>
 
@@ -4496,7 +4502,18 @@
                 <a:cs typeface="+mj-cs"/>
               </a:rPr>
             </a:br>
-            <a:br>
+            <a:r>
+              <a:rPr lang="hu-HU" sz="4000" kern="1200" dirty="0" err="1">
+                <a:solidFill>
+                  <a:srgbClr val="FFFFFF"/>
+                </a:solidFill>
+                <a:latin typeface="+mj-lt"/>
+                <a:ea typeface="+mj-ea"/>
+                <a:cs typeface="+mj-cs"/>
+              </a:rPr>
+              <a:t>User</a:t>
+            </a:r>
+            <a:r>
               <a:rPr lang="hu-HU" sz="4000" kern="1200" dirty="0">
                 <a:solidFill>
                   <a:srgbClr val="FFFFFF"/>
@@ -4505,25 +4522,7 @@
                 <a:ea typeface="+mj-ea"/>
                 <a:cs typeface="+mj-cs"/>
               </a:rPr>
-            </a:br>
-            <a:r>
-              <a:rPr lang="pl-PL" sz="4000" dirty="0">
-                <a:solidFill>
-                  <a:srgbClr val="FFFFFF"/>
-                </a:solidFill>
-              </a:rPr>
-              <a:t>M</a:t>
-            </a:r>
-            <a:r>
-              <a:rPr lang="pl-PL" sz="4000" kern="1200" dirty="0">
-                <a:solidFill>
-                  <a:srgbClr val="FFFFFF"/>
-                </a:solidFill>
-                <a:latin typeface="+mj-lt"/>
-                <a:ea typeface="+mj-ea"/>
-                <a:cs typeface="+mj-cs"/>
-              </a:rPr>
-              <a:t>i működött és mi nem</a:t>
+              <a:t> Story</a:t>
             </a:r>
             <a:endParaRPr lang="en-US" sz="4000" kern="1200" dirty="0">
               <a:solidFill>
@@ -4538,10 +4537,10 @@
       </p:sp>
       <p:sp>
         <p:nvSpPr>
-          <p:cNvPr id="6" name="Szövegdoboz 5">
-            <a:extLst>
-              <a:ext uri="{FF2B5EF4-FFF2-40B4-BE49-F238E27FC236}">
-                <a16:creationId xmlns:a16="http://schemas.microsoft.com/office/drawing/2014/main" id="{10D569DD-A2F1-E295-BC76-A9CC17A57343}"/>
+          <p:cNvPr id="5" name="Szövegdoboz 4">
+            <a:extLst>
+              <a:ext uri="{FF2B5EF4-FFF2-40B4-BE49-F238E27FC236}">
+                <a16:creationId xmlns:a16="http://schemas.microsoft.com/office/drawing/2014/main" id="{B694A0E1-1E4C-BC0A-57C6-85BECDF06951}"/>
               </a:ext>
             </a:extLst>
           </p:cNvPr>
@@ -4550,8 +4549,8 @@
         </p:nvSpPr>
         <p:spPr>
           <a:xfrm>
-            <a:off x="4298707" y="518791"/>
-            <a:ext cx="7894362" cy="4401205"/>
+            <a:off x="4038604" y="0"/>
+            <a:ext cx="8153396" cy="646331"/>
           </a:xfrm>
           <a:prstGeom prst="rect">
             <a:avLst/>
@@ -4559,92 +4558,87 @@
           <a:noFill/>
         </p:spPr>
         <p:txBody>
-          <a:bodyPr wrap="square" rtlCol="0">
+          <a:bodyPr wrap="square">
             <a:spAutoFit/>
           </a:bodyPr>
           <a:lstStyle/>
           <a:p>
             <a:r>
-              <a:rPr lang="hu-HU" sz="2800" dirty="0"/>
-              <a:t>- Nehéz kiválasztani, hogy éppen mi legyen a     következő nagy feladat</a:t>
+              <a:rPr lang="hu-HU" b="1" dirty="0">
+                <a:solidFill>
+                  <a:srgbClr val="000000"/>
+                </a:solidFill>
+                <a:latin typeface="Arial" panose="020B0604020202020204" pitchFamily="34" charset="0"/>
+              </a:rPr>
+              <a:t>Tulajdonosként szeretném látni, hogy adózás, gyártás és szállítás után mennyi lesz a várható bevételem a jövőben</a:t>
             </a:r>
           </a:p>
-          <a:p>
-            <a:r>
-              <a:rPr lang="hu-HU" sz="2800" dirty="0"/>
-              <a:t>- Az idő beosztása -&gt; „időben kész leszünk ezzel a feladattal?” </a:t>
-            </a:r>
-          </a:p>
-          <a:p>
-            <a:endParaRPr lang="hu-HU" sz="2800" dirty="0"/>
-          </a:p>
-          <a:p>
-            <a:r>
-              <a:rPr lang="hu-HU" sz="2800" dirty="0"/>
-              <a:t>- </a:t>
-            </a:r>
-            <a:r>
-              <a:rPr lang="hu-HU" sz="2800" dirty="0" err="1"/>
-              <a:t>User</a:t>
-            </a:r>
-            <a:r>
-              <a:rPr lang="hu-HU" sz="2800" dirty="0"/>
-              <a:t> Story létrehozása, </a:t>
-            </a:r>
-            <a:r>
-              <a:rPr lang="hu-HU" sz="2800" dirty="0" err="1"/>
-              <a:t>brainstorming</a:t>
-            </a:r>
-            <a:endParaRPr lang="hu-HU" sz="2800" dirty="0"/>
-          </a:p>
-          <a:p>
-            <a:r>
-              <a:rPr lang="hu-HU" sz="2800" b="0" i="0" dirty="0">
-                <a:solidFill>
-                  <a:srgbClr val="202124"/>
-                </a:solidFill>
-                <a:effectLst/>
-                <a:latin typeface="Google Sans"/>
-              </a:rPr>
-              <a:t>- Kanban </a:t>
-            </a:r>
-            <a:r>
-              <a:rPr lang="hu-HU" sz="2800" b="0" i="0" dirty="0" err="1">
-                <a:solidFill>
-                  <a:srgbClr val="202124"/>
-                </a:solidFill>
-                <a:effectLst/>
-                <a:latin typeface="Google Sans"/>
-              </a:rPr>
-              <a:t>board</a:t>
-            </a:r>
-            <a:r>
-              <a:rPr lang="hu-HU" sz="2800" b="0" i="0" dirty="0">
-                <a:solidFill>
-                  <a:srgbClr val="202124"/>
-                </a:solidFill>
-                <a:effectLst/>
-                <a:latin typeface="Google Sans"/>
-              </a:rPr>
-              <a:t>, haladások és visszajelzések</a:t>
-            </a:r>
-            <a:endParaRPr lang="hu-HU" sz="2800" dirty="0"/>
-          </a:p>
-          <a:p>
-            <a:r>
-              <a:rPr lang="hu-HU" sz="2800" dirty="0"/>
-              <a:t>- Mindenki saját maga be tudja vállalni, hogy mit csináljon</a:t>
-            </a:r>
-          </a:p>
-          <a:p>
-            <a:endParaRPr lang="hu-HU" sz="2800" dirty="0"/>
-          </a:p>
-        </p:txBody>
-      </p:sp>
+        </p:txBody>
+      </p:sp>
+      <p:pic>
+        <p:nvPicPr>
+          <p:cNvPr id="4" name="Kép 3">
+            <a:extLst>
+              <a:ext uri="{FF2B5EF4-FFF2-40B4-BE49-F238E27FC236}">
+                <a16:creationId xmlns:a16="http://schemas.microsoft.com/office/drawing/2014/main" id="{E0B9C4D9-9378-44F9-F4D5-61EB3AB3A7DA}"/>
+              </a:ext>
+            </a:extLst>
+          </p:cNvPr>
+          <p:cNvPicPr>
+            <a:picLocks noChangeAspect="1"/>
+          </p:cNvPicPr>
+          <p:nvPr/>
+        </p:nvPicPr>
+        <p:blipFill>
+          <a:blip r:embed="rId2"/>
+          <a:stretch>
+            <a:fillRect/>
+          </a:stretch>
+        </p:blipFill>
+        <p:spPr>
+          <a:xfrm>
+            <a:off x="4125501" y="845422"/>
+            <a:ext cx="7845322" cy="1042669"/>
+          </a:xfrm>
+          <a:prstGeom prst="rect">
+            <a:avLst/>
+          </a:prstGeom>
+        </p:spPr>
+      </p:pic>
+      <p:pic>
+        <p:nvPicPr>
+          <p:cNvPr id="7" name="Kép 6">
+            <a:extLst>
+              <a:ext uri="{FF2B5EF4-FFF2-40B4-BE49-F238E27FC236}">
+                <a16:creationId xmlns:a16="http://schemas.microsoft.com/office/drawing/2014/main" id="{1FC13297-520A-C142-F658-9FE865712AE6}"/>
+              </a:ext>
+            </a:extLst>
+          </p:cNvPr>
+          <p:cNvPicPr>
+            <a:picLocks noChangeAspect="1"/>
+          </p:cNvPicPr>
+          <p:nvPr/>
+        </p:nvPicPr>
+        <p:blipFill>
+          <a:blip r:embed="rId3"/>
+          <a:stretch>
+            <a:fillRect/>
+          </a:stretch>
+        </p:blipFill>
+        <p:spPr>
+          <a:xfrm>
+            <a:off x="4140023" y="2236540"/>
+            <a:ext cx="7830800" cy="3480819"/>
+          </a:xfrm>
+          <a:prstGeom prst="rect">
+            <a:avLst/>
+          </a:prstGeom>
+        </p:spPr>
+      </p:pic>
     </p:spTree>
     <p:extLst>
       <p:ext uri="{BB962C8B-B14F-4D97-AF65-F5344CB8AC3E}">
-        <p14:creationId xmlns:p14="http://schemas.microsoft.com/office/powerpoint/2010/main" val="2401646993"/>
+        <p14:creationId xmlns:p14="http://schemas.microsoft.com/office/powerpoint/2010/main" val="3955818282"/>
       </p:ext>
     </p:extLst>
   </p:cSld>
@@ -5163,7 +5157,7 @@
         <p:spPr>
           <a:xfrm>
             <a:off x="660041" y="2767106"/>
-            <a:ext cx="2972392" cy="3071906"/>
+            <a:ext cx="2880828" cy="3071906"/>
           </a:xfrm>
         </p:spPr>
         <p:txBody>
@@ -5209,7 +5203,18 @@
                   <a:srgbClr val="FFFFFF"/>
                 </a:solidFill>
               </a:rPr>
-              <a:t>Érdekességek</a:t>
+              <a:t>M</a:t>
+            </a:r>
+            <a:r>
+              <a:rPr lang="pl-PL" sz="4000" kern="1200" dirty="0">
+                <a:solidFill>
+                  <a:srgbClr val="FFFFFF"/>
+                </a:solidFill>
+                <a:latin typeface="+mj-lt"/>
+                <a:ea typeface="+mj-ea"/>
+                <a:cs typeface="+mj-cs"/>
+              </a:rPr>
+              <a:t>i működött és mi nem</a:t>
             </a:r>
             <a:endParaRPr lang="en-US" sz="4000" kern="1200" dirty="0">
               <a:solidFill>
@@ -5224,10 +5229,10 @@
       </p:sp>
       <p:sp>
         <p:nvSpPr>
-          <p:cNvPr id="3" name="Szövegdoboz 2">
-            <a:extLst>
-              <a:ext uri="{FF2B5EF4-FFF2-40B4-BE49-F238E27FC236}">
-                <a16:creationId xmlns:a16="http://schemas.microsoft.com/office/drawing/2014/main" id="{8C317145-3BB6-0810-C8DC-E38F3EF1C146}"/>
+          <p:cNvPr id="6" name="Szövegdoboz 5">
+            <a:extLst>
+              <a:ext uri="{FF2B5EF4-FFF2-40B4-BE49-F238E27FC236}">
+                <a16:creationId xmlns:a16="http://schemas.microsoft.com/office/drawing/2014/main" id="{10D569DD-A2F1-E295-BC76-A9CC17A57343}"/>
               </a:ext>
             </a:extLst>
           </p:cNvPr>
@@ -5236,8 +5241,8 @@
         </p:nvSpPr>
         <p:spPr>
           <a:xfrm>
-            <a:off x="4143840" y="470862"/>
-            <a:ext cx="7894362" cy="954107"/>
+            <a:off x="4298707" y="518791"/>
+            <a:ext cx="7894362" cy="4401205"/>
           </a:xfrm>
           <a:prstGeom prst="rect">
             <a:avLst/>
@@ -5249,6 +5254,21 @@
             <a:spAutoFit/>
           </a:bodyPr>
           <a:lstStyle/>
+          <a:p>
+            <a:r>
+              <a:rPr lang="hu-HU" sz="2800" dirty="0"/>
+              <a:t>- Nehéz kiválasztani, hogy éppen mi legyen a     következő nagy feladat</a:t>
+            </a:r>
+          </a:p>
+          <a:p>
+            <a:r>
+              <a:rPr lang="hu-HU" sz="2800" dirty="0"/>
+              <a:t>- Az idő beosztása -&gt; „időben kész leszünk ezzel a feladattal?” </a:t>
+            </a:r>
+          </a:p>
+          <a:p>
+            <a:endParaRPr lang="hu-HU" sz="2800" dirty="0"/>
+          </a:p>
           <a:p>
             <a:r>
               <a:rPr lang="hu-HU" sz="2800" dirty="0"/>
@@ -5256,33 +5276,66 @@
             </a:r>
             <a:r>
               <a:rPr lang="hu-HU" sz="2800" dirty="0" err="1"/>
-              <a:t>Extreme</a:t>
+              <a:t>User</a:t>
             </a:r>
             <a:r>
               <a:rPr lang="hu-HU" sz="2800" dirty="0"/>
-              <a:t> </a:t>
+              <a:t> Story létrehozása, </a:t>
             </a:r>
             <a:r>
               <a:rPr lang="hu-HU" sz="2800" dirty="0" err="1"/>
-              <a:t>Programming</a:t>
+              <a:t>brainstorming</a:t>
+            </a:r>
+            <a:endParaRPr lang="hu-HU" sz="2800" dirty="0"/>
+          </a:p>
+          <a:p>
+            <a:r>
+              <a:rPr lang="hu-HU" sz="2800" b="0" i="0" dirty="0">
+                <a:solidFill>
+                  <a:srgbClr val="202124"/>
+                </a:solidFill>
+                <a:effectLst/>
+                <a:latin typeface="Google Sans"/>
+              </a:rPr>
+              <a:t>- Kanban </a:t>
             </a:r>
             <a:r>
-              <a:rPr lang="hu-HU" sz="2800" dirty="0"/>
-              <a:t> kipróbálása</a:t>
+              <a:rPr lang="hu-HU" sz="2800" b="0" i="0" dirty="0" err="1">
+                <a:solidFill>
+                  <a:srgbClr val="202124"/>
+                </a:solidFill>
+                <a:effectLst/>
+                <a:latin typeface="Google Sans"/>
+              </a:rPr>
+              <a:t>board</a:t>
             </a:r>
+            <a:r>
+              <a:rPr lang="hu-HU" sz="2800" b="0" i="0" dirty="0">
+                <a:solidFill>
+                  <a:srgbClr val="202124"/>
+                </a:solidFill>
+                <a:effectLst/>
+                <a:latin typeface="Google Sans"/>
+              </a:rPr>
+              <a:t>, haladások és visszajelzések</a:t>
+            </a:r>
+            <a:endParaRPr lang="hu-HU" sz="2800" dirty="0"/>
           </a:p>
           <a:p>
             <a:r>
               <a:rPr lang="hu-HU" sz="2800" dirty="0"/>
-              <a:t>- Java Unit testek megismerése</a:t>
+              <a:t>- Mindenki saját maga be tudja vállalni, hogy mit csináljon</a:t>
             </a:r>
+          </a:p>
+          <a:p>
+            <a:endParaRPr lang="hu-HU" sz="2800" dirty="0"/>
           </a:p>
         </p:txBody>
       </p:sp>
     </p:spTree>
     <p:extLst>
       <p:ext uri="{BB962C8B-B14F-4D97-AF65-F5344CB8AC3E}">
-        <p14:creationId xmlns:p14="http://schemas.microsoft.com/office/powerpoint/2010/main" val="3768912322"/>
+        <p14:creationId xmlns:p14="http://schemas.microsoft.com/office/powerpoint/2010/main" val="2401646993"/>
       </p:ext>
     </p:extLst>
   </p:cSld>
@@ -5292,7 +5345,7 @@
 </p:sld>
 </file>
 
-<file path=ppt/slides/slide2.xml><?xml version="1.0" encoding="utf-8"?>
+<file path=ppt/slides/slide12.xml><?xml version="1.0" encoding="utf-8"?>
 <p:sld xmlns:a="http://schemas.openxmlformats.org/drawingml/2006/main" xmlns:r="http://schemas.openxmlformats.org/officeDocument/2006/relationships" xmlns:p="http://schemas.openxmlformats.org/presentationml/2006/main">
   <p:cSld>
     <p:spTree>
@@ -5801,7 +5854,7 @@
         <p:spPr>
           <a:xfrm>
             <a:off x="660041" y="2767106"/>
-            <a:ext cx="2880828" cy="3071906"/>
+            <a:ext cx="2972392" cy="3071906"/>
           </a:xfrm>
         </p:spPr>
         <p:txBody>
@@ -5819,10 +5872,10 @@
                 <a:ea typeface="+mj-ea"/>
                 <a:cs typeface="+mj-cs"/>
               </a:rPr>
-              <a:t>Sentinel </a:t>
+              <a:t>Sentinel</a:t>
             </a:r>
-            <a:r>
-              <a:rPr lang="en-US" sz="4000" kern="1200" dirty="0" err="1">
+            <a:br>
+              <a:rPr lang="hu-HU" sz="4000" kern="1200" dirty="0">
                 <a:solidFill>
                   <a:srgbClr val="FFFFFF"/>
                 </a:solidFill>
@@ -5830,7 +5883,24 @@
                 <a:ea typeface="+mj-ea"/>
                 <a:cs typeface="+mj-cs"/>
               </a:rPr>
-              <a:t>Vízió</a:t>
+            </a:br>
+            <a:br>
+              <a:rPr lang="hu-HU" sz="4000" kern="1200" dirty="0">
+                <a:solidFill>
+                  <a:srgbClr val="FFFFFF"/>
+                </a:solidFill>
+                <a:latin typeface="+mj-lt"/>
+                <a:ea typeface="+mj-ea"/>
+                <a:cs typeface="+mj-cs"/>
+              </a:rPr>
+            </a:br>
+            <a:r>
+              <a:rPr lang="pl-PL" sz="4000" dirty="0">
+                <a:solidFill>
+                  <a:srgbClr val="FFFFFF"/>
+                </a:solidFill>
+              </a:rPr>
+              <a:t>Érdekességek</a:t>
             </a:r>
             <a:endParaRPr lang="en-US" sz="4000" kern="1200" dirty="0">
               <a:solidFill>
@@ -5843,40 +5913,67 @@
           </a:p>
         </p:txBody>
       </p:sp>
-      <p:pic>
-        <p:nvPicPr>
-          <p:cNvPr id="11" name="Kép 10">
-            <a:extLst>
-              <a:ext uri="{FF2B5EF4-FFF2-40B4-BE49-F238E27FC236}">
-                <a16:creationId xmlns:a16="http://schemas.microsoft.com/office/drawing/2014/main" id="{33B73420-F353-14AA-BD57-A9DCE80214B9}"/>
-              </a:ext>
-            </a:extLst>
-          </p:cNvPr>
-          <p:cNvPicPr>
-            <a:picLocks noChangeAspect="1"/>
-          </p:cNvPicPr>
+      <p:sp>
+        <p:nvSpPr>
+          <p:cNvPr id="3" name="Szövegdoboz 2">
+            <a:extLst>
+              <a:ext uri="{FF2B5EF4-FFF2-40B4-BE49-F238E27FC236}">
+                <a16:creationId xmlns:a16="http://schemas.microsoft.com/office/drawing/2014/main" id="{8C317145-3BB6-0810-C8DC-E38F3EF1C146}"/>
+              </a:ext>
+            </a:extLst>
+          </p:cNvPr>
+          <p:cNvSpPr txBox="1"/>
           <p:nvPr/>
-        </p:nvPicPr>
-        <p:blipFill>
-          <a:blip r:embed="rId2"/>
-          <a:stretch>
-            <a:fillRect/>
-          </a:stretch>
-        </p:blipFill>
+        </p:nvSpPr>
         <p:spPr>
           <a:xfrm>
-            <a:off x="4313744" y="2008564"/>
-            <a:ext cx="7708352" cy="2671210"/>
+            <a:off x="4143840" y="470862"/>
+            <a:ext cx="7894362" cy="954107"/>
           </a:xfrm>
           <a:prstGeom prst="rect">
             <a:avLst/>
           </a:prstGeom>
-        </p:spPr>
-      </p:pic>
+          <a:noFill/>
+        </p:spPr>
+        <p:txBody>
+          <a:bodyPr wrap="square" rtlCol="0">
+            <a:spAutoFit/>
+          </a:bodyPr>
+          <a:lstStyle/>
+          <a:p>
+            <a:r>
+              <a:rPr lang="hu-HU" sz="2800" dirty="0"/>
+              <a:t>- </a:t>
+            </a:r>
+            <a:r>
+              <a:rPr lang="hu-HU" sz="2800" dirty="0" err="1"/>
+              <a:t>Extreme</a:t>
+            </a:r>
+            <a:r>
+              <a:rPr lang="hu-HU" sz="2800" dirty="0"/>
+              <a:t> </a:t>
+            </a:r>
+            <a:r>
+              <a:rPr lang="hu-HU" sz="2800" dirty="0" err="1"/>
+              <a:t>Programming</a:t>
+            </a:r>
+            <a:r>
+              <a:rPr lang="hu-HU" sz="2800" dirty="0"/>
+              <a:t> kipróbálása</a:t>
+            </a:r>
+          </a:p>
+          <a:p>
+            <a:r>
+              <a:rPr lang="hu-HU" sz="2800" dirty="0"/>
+              <a:t>- Java Unit testek megismerése</a:t>
+            </a:r>
+          </a:p>
+        </p:txBody>
+      </p:sp>
     </p:spTree>
     <p:extLst>
       <p:ext uri="{BB962C8B-B14F-4D97-AF65-F5344CB8AC3E}">
-        <p14:creationId xmlns:p14="http://schemas.microsoft.com/office/powerpoint/2010/main" val="2435359968"/>
+        <p14:creationId xmlns:p14="http://schemas.microsoft.com/office/powerpoint/2010/main" val="3768912322"/>
       </p:ext>
     </p:extLst>
   </p:cSld>
@@ -5886,7 +5983,7 @@
 </p:sld>
 </file>
 
-<file path=ppt/slides/slide3.xml><?xml version="1.0" encoding="utf-8"?>
+<file path=ppt/slides/slide2.xml><?xml version="1.0" encoding="utf-8"?>
 <p:sld xmlns:a="http://schemas.openxmlformats.org/drawingml/2006/main" xmlns:r="http://schemas.openxmlformats.org/officeDocument/2006/relationships" xmlns:p="http://schemas.openxmlformats.org/presentationml/2006/main">
   <p:cSld>
     <p:spTree>
@@ -6405,7 +6502,7 @@
           <a:lstStyle/>
           <a:p>
             <a:r>
-              <a:rPr lang="en-US" sz="4000" kern="1200">
+              <a:rPr lang="en-US" sz="4000" kern="1200" dirty="0">
                 <a:solidFill>
                   <a:srgbClr val="FFFFFF"/>
                 </a:solidFill>
@@ -6413,17 +6510,36 @@
                 <a:ea typeface="+mj-ea"/>
                 <a:cs typeface="+mj-cs"/>
               </a:rPr>
-              <a:t>Sentinel Vízió</a:t>
+              <a:t>Sentinel </a:t>
             </a:r>
+            <a:r>
+              <a:rPr lang="en-US" sz="4000" kern="1200" dirty="0" err="1">
+                <a:solidFill>
+                  <a:srgbClr val="FFFFFF"/>
+                </a:solidFill>
+                <a:latin typeface="+mj-lt"/>
+                <a:ea typeface="+mj-ea"/>
+                <a:cs typeface="+mj-cs"/>
+              </a:rPr>
+              <a:t>Vízió</a:t>
+            </a:r>
+            <a:endParaRPr lang="en-US" sz="4000" kern="1200" dirty="0">
+              <a:solidFill>
+                <a:srgbClr val="FFFFFF"/>
+              </a:solidFill>
+              <a:latin typeface="+mj-lt"/>
+              <a:ea typeface="+mj-ea"/>
+              <a:cs typeface="+mj-cs"/>
+            </a:endParaRPr>
           </a:p>
         </p:txBody>
       </p:sp>
       <p:pic>
         <p:nvPicPr>
-          <p:cNvPr id="4" name="Kép 3">
-            <a:extLst>
-              <a:ext uri="{FF2B5EF4-FFF2-40B4-BE49-F238E27FC236}">
-                <a16:creationId xmlns:a16="http://schemas.microsoft.com/office/drawing/2014/main" id="{40CDBE21-75BE-FC66-10E5-9AAE370B7811}"/>
+          <p:cNvPr id="11" name="Kép 10">
+            <a:extLst>
+              <a:ext uri="{FF2B5EF4-FFF2-40B4-BE49-F238E27FC236}">
+                <a16:creationId xmlns:a16="http://schemas.microsoft.com/office/drawing/2014/main" id="{33B73420-F353-14AA-BD57-A9DCE80214B9}"/>
               </a:ext>
             </a:extLst>
           </p:cNvPr>
@@ -6440,8 +6556,8 @@
         </p:blipFill>
         <p:spPr>
           <a:xfrm>
-            <a:off x="4304795" y="1790198"/>
-            <a:ext cx="7486734" cy="3115367"/>
+            <a:off x="4313744" y="2008564"/>
+            <a:ext cx="7708352" cy="2671210"/>
           </a:xfrm>
           <a:prstGeom prst="rect">
             <a:avLst/>
@@ -6451,7 +6567,7 @@
     </p:spTree>
     <p:extLst>
       <p:ext uri="{BB962C8B-B14F-4D97-AF65-F5344CB8AC3E}">
-        <p14:creationId xmlns:p14="http://schemas.microsoft.com/office/powerpoint/2010/main" val="2606135967"/>
+        <p14:creationId xmlns:p14="http://schemas.microsoft.com/office/powerpoint/2010/main" val="2435359968"/>
       </p:ext>
     </p:extLst>
   </p:cSld>
@@ -6461,7 +6577,7 @@
 </p:sld>
 </file>
 
-<file path=ppt/slides/slide4.xml><?xml version="1.0" encoding="utf-8"?>
+<file path=ppt/slides/slide3.xml><?xml version="1.0" encoding="utf-8"?>
 <p:sld xmlns:a="http://schemas.openxmlformats.org/drawingml/2006/main" xmlns:r="http://schemas.openxmlformats.org/officeDocument/2006/relationships" xmlns:p="http://schemas.openxmlformats.org/presentationml/2006/main">
   <p:cSld>
     <p:spTree>
@@ -6995,10 +7111,10 @@
       </p:sp>
       <p:pic>
         <p:nvPicPr>
-          <p:cNvPr id="9" name="Kép 8">
-            <a:extLst>
-              <a:ext uri="{FF2B5EF4-FFF2-40B4-BE49-F238E27FC236}">
-                <a16:creationId xmlns:a16="http://schemas.microsoft.com/office/drawing/2014/main" id="{C5D56194-1971-2121-2A7D-92D00372302D}"/>
+          <p:cNvPr id="4" name="Kép 3">
+            <a:extLst>
+              <a:ext uri="{FF2B5EF4-FFF2-40B4-BE49-F238E27FC236}">
+                <a16:creationId xmlns:a16="http://schemas.microsoft.com/office/drawing/2014/main" id="{40CDBE21-75BE-FC66-10E5-9AAE370B7811}"/>
               </a:ext>
             </a:extLst>
           </p:cNvPr>
@@ -7015,8 +7131,8 @@
         </p:blipFill>
         <p:spPr>
           <a:xfrm>
-            <a:off x="4346678" y="1012885"/>
-            <a:ext cx="7225748" cy="4999693"/>
+            <a:off x="4304795" y="1790198"/>
+            <a:ext cx="7486734" cy="3115367"/>
           </a:xfrm>
           <a:prstGeom prst="rect">
             <a:avLst/>
@@ -7026,7 +7142,7 @@
     </p:spTree>
     <p:extLst>
       <p:ext uri="{BB962C8B-B14F-4D97-AF65-F5344CB8AC3E}">
-        <p14:creationId xmlns:p14="http://schemas.microsoft.com/office/powerpoint/2010/main" val="513660778"/>
+        <p14:creationId xmlns:p14="http://schemas.microsoft.com/office/powerpoint/2010/main" val="2606135967"/>
       </p:ext>
     </p:extLst>
   </p:cSld>
@@ -7036,7 +7152,7 @@
 </p:sld>
 </file>
 
-<file path=ppt/slides/slide5.xml><?xml version="1.0" encoding="utf-8"?>
+<file path=ppt/slides/slide4.xml><?xml version="1.0" encoding="utf-8"?>
 <p:sld xmlns:a="http://schemas.openxmlformats.org/drawingml/2006/main" xmlns:r="http://schemas.openxmlformats.org/officeDocument/2006/relationships" xmlns:p="http://schemas.openxmlformats.org/presentationml/2006/main">
   <p:cSld>
     <p:spTree>
@@ -7555,7 +7671,7 @@
           <a:lstStyle/>
           <a:p>
             <a:r>
-              <a:rPr lang="en-US" sz="4000" kern="1200" dirty="0">
+              <a:rPr lang="en-US" sz="4000" kern="1200">
                 <a:solidFill>
                   <a:srgbClr val="FFFFFF"/>
                 </a:solidFill>
@@ -7563,57 +7679,17 @@
                 <a:ea typeface="+mj-ea"/>
                 <a:cs typeface="+mj-cs"/>
               </a:rPr>
-              <a:t>Sentinel</a:t>
+              <a:t>Sentinel Vízió</a:t>
             </a:r>
-            <a:br>
-              <a:rPr lang="hu-HU" sz="4000" kern="1200" dirty="0">
-                <a:solidFill>
-                  <a:srgbClr val="FFFFFF"/>
-                </a:solidFill>
-                <a:latin typeface="+mj-lt"/>
-                <a:ea typeface="+mj-ea"/>
-                <a:cs typeface="+mj-cs"/>
-              </a:rPr>
-            </a:br>
-            <a:r>
-              <a:rPr lang="hu-HU" sz="4000" kern="1200" dirty="0" err="1">
-                <a:solidFill>
-                  <a:srgbClr val="FFFFFF"/>
-                </a:solidFill>
-                <a:latin typeface="+mj-lt"/>
-                <a:ea typeface="+mj-ea"/>
-                <a:cs typeface="+mj-cs"/>
-              </a:rPr>
-              <a:t>User</a:t>
-            </a:r>
-            <a:r>
-              <a:rPr lang="hu-HU" sz="4000" kern="1200" dirty="0">
-                <a:solidFill>
-                  <a:srgbClr val="FFFFFF"/>
-                </a:solidFill>
-                <a:latin typeface="+mj-lt"/>
-                <a:ea typeface="+mj-ea"/>
-                <a:cs typeface="+mj-cs"/>
-              </a:rPr>
-              <a:t> Story</a:t>
-            </a:r>
-            <a:endParaRPr lang="en-US" sz="4000" kern="1200" dirty="0">
-              <a:solidFill>
-                <a:srgbClr val="FFFFFF"/>
-              </a:solidFill>
-              <a:latin typeface="+mj-lt"/>
-              <a:ea typeface="+mj-ea"/>
-              <a:cs typeface="+mj-cs"/>
-            </a:endParaRPr>
           </a:p>
         </p:txBody>
       </p:sp>
       <p:pic>
         <p:nvPicPr>
-          <p:cNvPr id="4" name="Kép 3">
-            <a:extLst>
-              <a:ext uri="{FF2B5EF4-FFF2-40B4-BE49-F238E27FC236}">
-                <a16:creationId xmlns:a16="http://schemas.microsoft.com/office/drawing/2014/main" id="{F218F3D5-E9AC-B681-9E98-8848365B55F8}"/>
+          <p:cNvPr id="9" name="Kép 8">
+            <a:extLst>
+              <a:ext uri="{FF2B5EF4-FFF2-40B4-BE49-F238E27FC236}">
+                <a16:creationId xmlns:a16="http://schemas.microsoft.com/office/drawing/2014/main" id="{C5D56194-1971-2121-2A7D-92D00372302D}"/>
               </a:ext>
             </a:extLst>
           </p:cNvPr>
@@ -7630,8 +7706,8 @@
         </p:blipFill>
         <p:spPr>
           <a:xfrm>
-            <a:off x="4601043" y="1261772"/>
-            <a:ext cx="5477639" cy="4163006"/>
+            <a:off x="4346678" y="1012885"/>
+            <a:ext cx="7225748" cy="4999693"/>
           </a:xfrm>
           <a:prstGeom prst="rect">
             <a:avLst/>
@@ -7641,7 +7717,7 @@
     </p:spTree>
     <p:extLst>
       <p:ext uri="{BB962C8B-B14F-4D97-AF65-F5344CB8AC3E}">
-        <p14:creationId xmlns:p14="http://schemas.microsoft.com/office/powerpoint/2010/main" val="4098640570"/>
+        <p14:creationId xmlns:p14="http://schemas.microsoft.com/office/powerpoint/2010/main" val="513660778"/>
       </p:ext>
     </p:extLst>
   </p:cSld>
@@ -7651,7 +7727,7 @@
 </p:sld>
 </file>
 
-<file path=ppt/slides/slide6.xml><?xml version="1.0" encoding="utf-8"?>
+<file path=ppt/slides/slide5.xml><?xml version="1.0" encoding="utf-8"?>
 <p:sld xmlns:a="http://schemas.openxmlformats.org/drawingml/2006/main" xmlns:r="http://schemas.openxmlformats.org/officeDocument/2006/relationships" xmlns:p="http://schemas.openxmlformats.org/presentationml/2006/main">
   <p:cSld>
     <p:spTree>
@@ -8223,52 +8299,40 @@
           </a:p>
         </p:txBody>
       </p:sp>
-      <p:sp>
-        <p:nvSpPr>
-          <p:cNvPr id="5" name="Szövegdoboz 4">
-            <a:extLst>
-              <a:ext uri="{FF2B5EF4-FFF2-40B4-BE49-F238E27FC236}">
-                <a16:creationId xmlns:a16="http://schemas.microsoft.com/office/drawing/2014/main" id="{B694A0E1-1E4C-BC0A-57C6-85BECDF06951}"/>
-              </a:ext>
-            </a:extLst>
-          </p:cNvPr>
-          <p:cNvSpPr txBox="1"/>
+      <p:pic>
+        <p:nvPicPr>
+          <p:cNvPr id="4" name="Kép 3">
+            <a:extLst>
+              <a:ext uri="{FF2B5EF4-FFF2-40B4-BE49-F238E27FC236}">
+                <a16:creationId xmlns:a16="http://schemas.microsoft.com/office/drawing/2014/main" id="{F218F3D5-E9AC-B681-9E98-8848365B55F8}"/>
+              </a:ext>
+            </a:extLst>
+          </p:cNvPr>
+          <p:cNvPicPr>
+            <a:picLocks noChangeAspect="1"/>
+          </p:cNvPicPr>
           <p:nvPr/>
-        </p:nvSpPr>
+        </p:nvPicPr>
+        <p:blipFill>
+          <a:blip r:embed="rId2"/>
+          <a:stretch>
+            <a:fillRect/>
+          </a:stretch>
+        </p:blipFill>
         <p:spPr>
           <a:xfrm>
-            <a:off x="4038604" y="0"/>
-            <a:ext cx="8153396" cy="646331"/>
+            <a:off x="4601043" y="1261772"/>
+            <a:ext cx="5477639" cy="4163006"/>
           </a:xfrm>
           <a:prstGeom prst="rect">
             <a:avLst/>
           </a:prstGeom>
-          <a:noFill/>
-        </p:spPr>
-        <p:txBody>
-          <a:bodyPr wrap="square">
-            <a:spAutoFit/>
-          </a:bodyPr>
-          <a:lstStyle/>
-          <a:p>
-            <a:r>
-              <a:rPr lang="hu-HU" b="1" dirty="0">
-                <a:solidFill>
-                  <a:srgbClr val="000000"/>
-                </a:solidFill>
-                <a:effectLst/>
-                <a:latin typeface="Arial" panose="020B0604020202020204" pitchFamily="34" charset="0"/>
-              </a:rPr>
-              <a:t>Tulajdonosként szeretném látni, hogy adózás, gyártás és szállítás után mennyi lesz a várható bevételem a jövőben</a:t>
-            </a:r>
-            <a:endParaRPr lang="hu-HU" b="1" dirty="0"/>
-          </a:p>
-        </p:txBody>
-      </p:sp>
+        </p:spPr>
+      </p:pic>
     </p:spTree>
     <p:extLst>
       <p:ext uri="{BB962C8B-B14F-4D97-AF65-F5344CB8AC3E}">
-        <p14:creationId xmlns:p14="http://schemas.microsoft.com/office/powerpoint/2010/main" val="2608495846"/>
+        <p14:creationId xmlns:p14="http://schemas.microsoft.com/office/powerpoint/2010/main" val="4098640570"/>
       </p:ext>
     </p:extLst>
   </p:cSld>
@@ -8278,7 +8342,7 @@
 </p:sld>
 </file>
 
-<file path=ppt/slides/slide7.xml><?xml version="1.0" encoding="utf-8"?>
+<file path=ppt/slides/slide6.xml><?xml version="1.0" encoding="utf-8"?>
 <p:sld xmlns:a="http://schemas.openxmlformats.org/drawingml/2006/main" xmlns:r="http://schemas.openxmlformats.org/officeDocument/2006/relationships" xmlns:p="http://schemas.openxmlformats.org/presentationml/2006/main">
   <p:cSld>
     <p:spTree>
@@ -8797,7 +8861,7 @@
           <a:lstStyle/>
           <a:p>
             <a:r>
-              <a:rPr lang="en-US" sz="4000" kern="1200">
+              <a:rPr lang="en-US" sz="4000" kern="1200" dirty="0">
                 <a:solidFill>
                   <a:srgbClr val="FFFFFF"/>
                 </a:solidFill>
@@ -8808,7 +8872,7 @@
               <a:t>Sentinel</a:t>
             </a:r>
             <a:br>
-              <a:rPr lang="hu-HU" sz="4000" kern="1200">
+              <a:rPr lang="hu-HU" sz="4000" kern="1200" dirty="0">
                 <a:solidFill>
                   <a:srgbClr val="FFFFFF"/>
                 </a:solidFill>
@@ -8818,7 +8882,7 @@
               </a:rPr>
             </a:br>
             <a:r>
-              <a:rPr lang="hu-HU" sz="4000" kern="1200">
+              <a:rPr lang="hu-HU" sz="4000" kern="1200" dirty="0" err="1">
                 <a:solidFill>
                   <a:srgbClr val="FFFFFF"/>
                 </a:solidFill>
@@ -8826,7 +8890,18 @@
                 <a:ea typeface="+mj-ea"/>
                 <a:cs typeface="+mj-cs"/>
               </a:rPr>
-              <a:t>User Story</a:t>
+              <a:t>User</a:t>
+            </a:r>
+            <a:r>
+              <a:rPr lang="hu-HU" sz="4000" kern="1200" dirty="0">
+                <a:solidFill>
+                  <a:srgbClr val="FFFFFF"/>
+                </a:solidFill>
+                <a:latin typeface="+mj-lt"/>
+                <a:ea typeface="+mj-ea"/>
+                <a:cs typeface="+mj-cs"/>
+              </a:rPr>
+              <a:t> Story</a:t>
             </a:r>
             <a:endParaRPr lang="en-US" sz="4000" kern="1200" dirty="0">
               <a:solidFill>
@@ -8854,7 +8929,7 @@
         <p:spPr>
           <a:xfrm>
             <a:off x="4038604" y="0"/>
-            <a:ext cx="8153396" cy="923330"/>
+            <a:ext cx="8153396" cy="646331"/>
           </a:xfrm>
           <a:prstGeom prst="rect">
             <a:avLst/>
@@ -8868,193 +8943,23 @@
           <a:lstStyle/>
           <a:p>
             <a:r>
-              <a:rPr lang="hu-HU" b="1" i="0" dirty="0">
+              <a:rPr lang="hu-HU" b="1" dirty="0">
                 <a:solidFill>
-                  <a:srgbClr val="1F1F1F"/>
+                  <a:srgbClr val="000000"/>
                 </a:solidFill>
                 <a:effectLst/>
-                <a:latin typeface="Google Sans"/>
+                <a:latin typeface="Arial" panose="020B0604020202020204" pitchFamily="34" charset="0"/>
               </a:rPr>
-              <a:t>Felhasználóként szeretném látni, hogy milyen termékek kelendőek, hogy ki tudjam azok </a:t>
-            </a:r>
-            <a:r>
-              <a:rPr lang="hu-HU" b="1" dirty="0">
-                <a:solidFill>
-                  <a:srgbClr val="1F1F1F"/>
-                </a:solidFill>
-                <a:effectLst/>
-                <a:latin typeface="Google Sans"/>
-              </a:rPr>
-              <a:t>alapján</a:t>
-            </a:r>
-            <a:r>
-              <a:rPr lang="hu-HU" b="1" i="0" dirty="0">
-                <a:solidFill>
-                  <a:srgbClr val="1F1F1F"/>
-                </a:solidFill>
-                <a:effectLst/>
-                <a:latin typeface="Google Sans"/>
-              </a:rPr>
-              <a:t> választani, hogy milyen termékeket tegyünk jól látható helyre az üzletben </a:t>
+              <a:t>Tulajdonosként szeretném látni, hogy adózás, gyártás és szállítás után mennyi lesz a várható bevételem a jövőben</a:t>
             </a:r>
             <a:endParaRPr lang="hu-HU" b="1" dirty="0"/>
           </a:p>
         </p:txBody>
       </p:sp>
-      <p:pic>
-        <p:nvPicPr>
-          <p:cNvPr id="7" name="Kép 6">
-            <a:extLst>
-              <a:ext uri="{FF2B5EF4-FFF2-40B4-BE49-F238E27FC236}">
-                <a16:creationId xmlns:a16="http://schemas.microsoft.com/office/drawing/2014/main" id="{6EE243CD-803C-7757-727B-77C1719642FC}"/>
-              </a:ext>
-            </a:extLst>
-          </p:cNvPr>
-          <p:cNvPicPr>
-            <a:picLocks noChangeAspect="1"/>
-          </p:cNvPicPr>
-          <p:nvPr/>
-        </p:nvPicPr>
-        <p:blipFill>
-          <a:blip r:embed="rId2"/>
-          <a:stretch>
-            <a:fillRect/>
-          </a:stretch>
-        </p:blipFill>
-        <p:spPr>
-          <a:xfrm>
-            <a:off x="4240624" y="1953695"/>
-            <a:ext cx="3390893" cy="4799120"/>
-          </a:xfrm>
-          <a:prstGeom prst="rect">
-            <a:avLst/>
-          </a:prstGeom>
-        </p:spPr>
-      </p:pic>
-      <p:pic>
-        <p:nvPicPr>
-          <p:cNvPr id="13" name="Kép 12">
-            <a:extLst>
-              <a:ext uri="{FF2B5EF4-FFF2-40B4-BE49-F238E27FC236}">
-                <a16:creationId xmlns:a16="http://schemas.microsoft.com/office/drawing/2014/main" id="{327BD58A-9C81-32D0-1B3A-AD0969591FE9}"/>
-              </a:ext>
-            </a:extLst>
-          </p:cNvPr>
-          <p:cNvPicPr>
-            <a:picLocks noChangeAspect="1"/>
-          </p:cNvPicPr>
-          <p:nvPr/>
-        </p:nvPicPr>
-        <p:blipFill>
-          <a:blip r:embed="rId3"/>
-          <a:stretch>
-            <a:fillRect/>
-          </a:stretch>
-        </p:blipFill>
-        <p:spPr>
-          <a:xfrm>
-            <a:off x="7831399" y="4311050"/>
-            <a:ext cx="3456267" cy="2476806"/>
-          </a:xfrm>
-          <a:prstGeom prst="rect">
-            <a:avLst/>
-          </a:prstGeom>
-        </p:spPr>
-      </p:pic>
-      <p:pic>
-        <p:nvPicPr>
-          <p:cNvPr id="15" name="Kép 14">
-            <a:extLst>
-              <a:ext uri="{FF2B5EF4-FFF2-40B4-BE49-F238E27FC236}">
-                <a16:creationId xmlns:a16="http://schemas.microsoft.com/office/drawing/2014/main" id="{CE7868AB-E240-DF4A-BF17-F71B9A0FECBF}"/>
-              </a:ext>
-            </a:extLst>
-          </p:cNvPr>
-          <p:cNvPicPr>
-            <a:picLocks noChangeAspect="1"/>
-          </p:cNvPicPr>
-          <p:nvPr/>
-        </p:nvPicPr>
-        <p:blipFill>
-          <a:blip r:embed="rId4"/>
-          <a:stretch>
-            <a:fillRect/>
-          </a:stretch>
-        </p:blipFill>
-        <p:spPr>
-          <a:xfrm>
-            <a:off x="7831399" y="2252927"/>
-            <a:ext cx="3792169" cy="1987980"/>
-          </a:xfrm>
-          <a:prstGeom prst="rect">
-            <a:avLst/>
-          </a:prstGeom>
-        </p:spPr>
-      </p:pic>
-      <p:pic>
-        <p:nvPicPr>
-          <p:cNvPr id="17" name="Kép 16">
-            <a:extLst>
-              <a:ext uri="{FF2B5EF4-FFF2-40B4-BE49-F238E27FC236}">
-                <a16:creationId xmlns:a16="http://schemas.microsoft.com/office/drawing/2014/main" id="{93716DAE-0D93-6E2C-2799-1AC804B005C6}"/>
-              </a:ext>
-            </a:extLst>
-          </p:cNvPr>
-          <p:cNvPicPr>
-            <a:picLocks noChangeAspect="1"/>
-          </p:cNvPicPr>
-          <p:nvPr/>
-        </p:nvPicPr>
-        <p:blipFill>
-          <a:blip r:embed="rId5"/>
-          <a:stretch>
-            <a:fillRect/>
-          </a:stretch>
-        </p:blipFill>
-        <p:spPr>
-          <a:xfrm>
-            <a:off x="7831399" y="645308"/>
-            <a:ext cx="3757449" cy="1572547"/>
-          </a:xfrm>
-          <a:prstGeom prst="rect">
-            <a:avLst/>
-          </a:prstGeom>
-        </p:spPr>
-      </p:pic>
-      <p:pic>
-        <p:nvPicPr>
-          <p:cNvPr id="19" name="Kép 18">
-            <a:extLst>
-              <a:ext uri="{FF2B5EF4-FFF2-40B4-BE49-F238E27FC236}">
-                <a16:creationId xmlns:a16="http://schemas.microsoft.com/office/drawing/2014/main" id="{185A4A89-5300-0AD8-6DBE-2247EE336960}"/>
-              </a:ext>
-            </a:extLst>
-          </p:cNvPr>
-          <p:cNvPicPr>
-            <a:picLocks noChangeAspect="1"/>
-          </p:cNvPicPr>
-          <p:nvPr/>
-        </p:nvPicPr>
-        <p:blipFill>
-          <a:blip r:embed="rId6"/>
-          <a:stretch>
-            <a:fillRect/>
-          </a:stretch>
-        </p:blipFill>
-        <p:spPr>
-          <a:xfrm>
-            <a:off x="5878672" y="652637"/>
-            <a:ext cx="1752845" cy="1283239"/>
-          </a:xfrm>
-          <a:prstGeom prst="rect">
-            <a:avLst/>
-          </a:prstGeom>
-        </p:spPr>
-      </p:pic>
     </p:spTree>
     <p:extLst>
       <p:ext uri="{BB962C8B-B14F-4D97-AF65-F5344CB8AC3E}">
-        <p14:creationId xmlns:p14="http://schemas.microsoft.com/office/powerpoint/2010/main" val="1629763152"/>
+        <p14:creationId xmlns:p14="http://schemas.microsoft.com/office/powerpoint/2010/main" val="2608495846"/>
       </p:ext>
     </p:extLst>
   </p:cSld>
@@ -9064,7 +8969,7 @@
 </p:sld>
 </file>
 
-<file path=ppt/slides/slide8.xml><?xml version="1.0" encoding="utf-8"?>
+<file path=ppt/slides/slide7.xml><?xml version="1.0" encoding="utf-8"?>
 <p:sld xmlns:a="http://schemas.openxmlformats.org/drawingml/2006/main" xmlns:r="http://schemas.openxmlformats.org/officeDocument/2006/relationships" xmlns:p="http://schemas.openxmlformats.org/presentationml/2006/main">
   <p:cSld>
     <p:spTree>
@@ -9689,10 +9594,10 @@
       </p:sp>
       <p:pic>
         <p:nvPicPr>
-          <p:cNvPr id="21" name="Kép 20">
-            <a:extLst>
-              <a:ext uri="{FF2B5EF4-FFF2-40B4-BE49-F238E27FC236}">
-                <a16:creationId xmlns:a16="http://schemas.microsoft.com/office/drawing/2014/main" id="{471C67F7-E22D-FEF7-6D95-9BEAC260773E}"/>
+          <p:cNvPr id="7" name="Kép 6">
+            <a:extLst>
+              <a:ext uri="{FF2B5EF4-FFF2-40B4-BE49-F238E27FC236}">
+                <a16:creationId xmlns:a16="http://schemas.microsoft.com/office/drawing/2014/main" id="{6EE243CD-803C-7757-727B-77C1719642FC}"/>
               </a:ext>
             </a:extLst>
           </p:cNvPr>
@@ -9709,8 +9614,8 @@
         </p:blipFill>
         <p:spPr>
           <a:xfrm>
-            <a:off x="6727748" y="1124476"/>
-            <a:ext cx="3238952" cy="1114581"/>
+            <a:off x="4240624" y="1953695"/>
+            <a:ext cx="3390893" cy="4799120"/>
           </a:xfrm>
           <a:prstGeom prst="rect">
             <a:avLst/>
@@ -9719,10 +9624,10 @@
       </p:pic>
       <p:pic>
         <p:nvPicPr>
-          <p:cNvPr id="23" name="Kép 22">
-            <a:extLst>
-              <a:ext uri="{FF2B5EF4-FFF2-40B4-BE49-F238E27FC236}">
-                <a16:creationId xmlns:a16="http://schemas.microsoft.com/office/drawing/2014/main" id="{A2BC12C5-DC71-5425-C5FF-8F4B799A6F0D}"/>
+          <p:cNvPr id="13" name="Kép 12">
+            <a:extLst>
+              <a:ext uri="{FF2B5EF4-FFF2-40B4-BE49-F238E27FC236}">
+                <a16:creationId xmlns:a16="http://schemas.microsoft.com/office/drawing/2014/main" id="{327BD58A-9C81-32D0-1B3A-AD0969591FE9}"/>
               </a:ext>
             </a:extLst>
           </p:cNvPr>
@@ -9739,8 +9644,8 @@
         </p:blipFill>
         <p:spPr>
           <a:xfrm>
-            <a:off x="4143840" y="1124476"/>
-            <a:ext cx="2353003" cy="2343477"/>
+            <a:off x="7831399" y="4311050"/>
+            <a:ext cx="3456267" cy="2476806"/>
           </a:xfrm>
           <a:prstGeom prst="rect">
             <a:avLst/>
@@ -9749,10 +9654,10 @@
       </p:pic>
       <p:pic>
         <p:nvPicPr>
-          <p:cNvPr id="25" name="Kép 24">
-            <a:extLst>
-              <a:ext uri="{FF2B5EF4-FFF2-40B4-BE49-F238E27FC236}">
-                <a16:creationId xmlns:a16="http://schemas.microsoft.com/office/drawing/2014/main" id="{B84C72B2-4577-FFD1-0006-B7FC598AFE43}"/>
+          <p:cNvPr id="15" name="Kép 14">
+            <a:extLst>
+              <a:ext uri="{FF2B5EF4-FFF2-40B4-BE49-F238E27FC236}">
+                <a16:creationId xmlns:a16="http://schemas.microsoft.com/office/drawing/2014/main" id="{CE7868AB-E240-DF4A-BF17-F71B9A0FECBF}"/>
               </a:ext>
             </a:extLst>
           </p:cNvPr>
@@ -9769,8 +9674,68 @@
         </p:blipFill>
         <p:spPr>
           <a:xfrm>
-            <a:off x="4143840" y="3729148"/>
-            <a:ext cx="6144482" cy="2152950"/>
+            <a:off x="7831399" y="2252927"/>
+            <a:ext cx="3792169" cy="1987980"/>
+          </a:xfrm>
+          <a:prstGeom prst="rect">
+            <a:avLst/>
+          </a:prstGeom>
+        </p:spPr>
+      </p:pic>
+      <p:pic>
+        <p:nvPicPr>
+          <p:cNvPr id="17" name="Kép 16">
+            <a:extLst>
+              <a:ext uri="{FF2B5EF4-FFF2-40B4-BE49-F238E27FC236}">
+                <a16:creationId xmlns:a16="http://schemas.microsoft.com/office/drawing/2014/main" id="{93716DAE-0D93-6E2C-2799-1AC804B005C6}"/>
+              </a:ext>
+            </a:extLst>
+          </p:cNvPr>
+          <p:cNvPicPr>
+            <a:picLocks noChangeAspect="1"/>
+          </p:cNvPicPr>
+          <p:nvPr/>
+        </p:nvPicPr>
+        <p:blipFill>
+          <a:blip r:embed="rId5"/>
+          <a:stretch>
+            <a:fillRect/>
+          </a:stretch>
+        </p:blipFill>
+        <p:spPr>
+          <a:xfrm>
+            <a:off x="7831399" y="645308"/>
+            <a:ext cx="3757449" cy="1572547"/>
+          </a:xfrm>
+          <a:prstGeom prst="rect">
+            <a:avLst/>
+          </a:prstGeom>
+        </p:spPr>
+      </p:pic>
+      <p:pic>
+        <p:nvPicPr>
+          <p:cNvPr id="19" name="Kép 18">
+            <a:extLst>
+              <a:ext uri="{FF2B5EF4-FFF2-40B4-BE49-F238E27FC236}">
+                <a16:creationId xmlns:a16="http://schemas.microsoft.com/office/drawing/2014/main" id="{185A4A89-5300-0AD8-6DBE-2247EE336960}"/>
+              </a:ext>
+            </a:extLst>
+          </p:cNvPr>
+          <p:cNvPicPr>
+            <a:picLocks noChangeAspect="1"/>
+          </p:cNvPicPr>
+          <p:nvPr/>
+        </p:nvPicPr>
+        <p:blipFill>
+          <a:blip r:embed="rId6"/>
+          <a:stretch>
+            <a:fillRect/>
+          </a:stretch>
+        </p:blipFill>
+        <p:spPr>
+          <a:xfrm>
+            <a:off x="5878672" y="652637"/>
+            <a:ext cx="1752845" cy="1283239"/>
           </a:xfrm>
           <a:prstGeom prst="rect">
             <a:avLst/>
@@ -9780,7 +9745,7 @@
     </p:spTree>
     <p:extLst>
       <p:ext uri="{BB962C8B-B14F-4D97-AF65-F5344CB8AC3E}">
-        <p14:creationId xmlns:p14="http://schemas.microsoft.com/office/powerpoint/2010/main" val="4193024657"/>
+        <p14:creationId xmlns:p14="http://schemas.microsoft.com/office/powerpoint/2010/main" val="1629763152"/>
       </p:ext>
     </p:extLst>
   </p:cSld>
@@ -9790,7 +9755,7 @@
 </p:sld>
 </file>
 
-<file path=ppt/slides/slide9.xml><?xml version="1.0" encoding="utf-8"?>
+<file path=ppt/slides/slide8.xml><?xml version="1.0" encoding="utf-8"?>
 <p:sld xmlns:a="http://schemas.openxmlformats.org/drawingml/2006/main" xmlns:r="http://schemas.openxmlformats.org/officeDocument/2006/relationships" xmlns:p="http://schemas.openxmlformats.org/presentationml/2006/main">
   <p:cSld>
     <p:spTree>
@@ -10309,6 +10274,732 @@
           <a:lstStyle/>
           <a:p>
             <a:r>
+              <a:rPr lang="en-US" sz="4000" kern="1200">
+                <a:solidFill>
+                  <a:srgbClr val="FFFFFF"/>
+                </a:solidFill>
+                <a:latin typeface="+mj-lt"/>
+                <a:ea typeface="+mj-ea"/>
+                <a:cs typeface="+mj-cs"/>
+              </a:rPr>
+              <a:t>Sentinel</a:t>
+            </a:r>
+            <a:br>
+              <a:rPr lang="hu-HU" sz="4000" kern="1200">
+                <a:solidFill>
+                  <a:srgbClr val="FFFFFF"/>
+                </a:solidFill>
+                <a:latin typeface="+mj-lt"/>
+                <a:ea typeface="+mj-ea"/>
+                <a:cs typeface="+mj-cs"/>
+              </a:rPr>
+            </a:br>
+            <a:r>
+              <a:rPr lang="hu-HU" sz="4000" kern="1200">
+                <a:solidFill>
+                  <a:srgbClr val="FFFFFF"/>
+                </a:solidFill>
+                <a:latin typeface="+mj-lt"/>
+                <a:ea typeface="+mj-ea"/>
+                <a:cs typeface="+mj-cs"/>
+              </a:rPr>
+              <a:t>User Story</a:t>
+            </a:r>
+            <a:endParaRPr lang="en-US" sz="4000" kern="1200" dirty="0">
+              <a:solidFill>
+                <a:srgbClr val="FFFFFF"/>
+              </a:solidFill>
+              <a:latin typeface="+mj-lt"/>
+              <a:ea typeface="+mj-ea"/>
+              <a:cs typeface="+mj-cs"/>
+            </a:endParaRPr>
+          </a:p>
+        </p:txBody>
+      </p:sp>
+      <p:sp>
+        <p:nvSpPr>
+          <p:cNvPr id="5" name="Szövegdoboz 4">
+            <a:extLst>
+              <a:ext uri="{FF2B5EF4-FFF2-40B4-BE49-F238E27FC236}">
+                <a16:creationId xmlns:a16="http://schemas.microsoft.com/office/drawing/2014/main" id="{B694A0E1-1E4C-BC0A-57C6-85BECDF06951}"/>
+              </a:ext>
+            </a:extLst>
+          </p:cNvPr>
+          <p:cNvSpPr txBox="1"/>
+          <p:nvPr/>
+        </p:nvSpPr>
+        <p:spPr>
+          <a:xfrm>
+            <a:off x="4038604" y="0"/>
+            <a:ext cx="8153396" cy="923330"/>
+          </a:xfrm>
+          <a:prstGeom prst="rect">
+            <a:avLst/>
+          </a:prstGeom>
+          <a:noFill/>
+        </p:spPr>
+        <p:txBody>
+          <a:bodyPr wrap="square">
+            <a:spAutoFit/>
+          </a:bodyPr>
+          <a:lstStyle/>
+          <a:p>
+            <a:r>
+              <a:rPr lang="hu-HU" b="1" i="0" dirty="0">
+                <a:solidFill>
+                  <a:srgbClr val="1F1F1F"/>
+                </a:solidFill>
+                <a:effectLst/>
+                <a:latin typeface="Google Sans"/>
+              </a:rPr>
+              <a:t>Felhasználóként szeretném látni, hogy milyen termékek kelendőek, hogy ki tudjam azok </a:t>
+            </a:r>
+            <a:r>
+              <a:rPr lang="hu-HU" b="1" dirty="0">
+                <a:solidFill>
+                  <a:srgbClr val="1F1F1F"/>
+                </a:solidFill>
+                <a:effectLst/>
+                <a:latin typeface="Google Sans"/>
+              </a:rPr>
+              <a:t>alapján</a:t>
+            </a:r>
+            <a:r>
+              <a:rPr lang="hu-HU" b="1" i="0" dirty="0">
+                <a:solidFill>
+                  <a:srgbClr val="1F1F1F"/>
+                </a:solidFill>
+                <a:effectLst/>
+                <a:latin typeface="Google Sans"/>
+              </a:rPr>
+              <a:t> választani, hogy milyen termékeket tegyünk jól látható helyre az üzletben </a:t>
+            </a:r>
+            <a:endParaRPr lang="hu-HU" b="1" dirty="0"/>
+          </a:p>
+        </p:txBody>
+      </p:sp>
+      <p:pic>
+        <p:nvPicPr>
+          <p:cNvPr id="21" name="Kép 20">
+            <a:extLst>
+              <a:ext uri="{FF2B5EF4-FFF2-40B4-BE49-F238E27FC236}">
+                <a16:creationId xmlns:a16="http://schemas.microsoft.com/office/drawing/2014/main" id="{471C67F7-E22D-FEF7-6D95-9BEAC260773E}"/>
+              </a:ext>
+            </a:extLst>
+          </p:cNvPr>
+          <p:cNvPicPr>
+            <a:picLocks noChangeAspect="1"/>
+          </p:cNvPicPr>
+          <p:nvPr/>
+        </p:nvPicPr>
+        <p:blipFill>
+          <a:blip r:embed="rId2"/>
+          <a:stretch>
+            <a:fillRect/>
+          </a:stretch>
+        </p:blipFill>
+        <p:spPr>
+          <a:xfrm>
+            <a:off x="6727748" y="1124476"/>
+            <a:ext cx="3238952" cy="1114581"/>
+          </a:xfrm>
+          <a:prstGeom prst="rect">
+            <a:avLst/>
+          </a:prstGeom>
+        </p:spPr>
+      </p:pic>
+      <p:pic>
+        <p:nvPicPr>
+          <p:cNvPr id="23" name="Kép 22">
+            <a:extLst>
+              <a:ext uri="{FF2B5EF4-FFF2-40B4-BE49-F238E27FC236}">
+                <a16:creationId xmlns:a16="http://schemas.microsoft.com/office/drawing/2014/main" id="{A2BC12C5-DC71-5425-C5FF-8F4B799A6F0D}"/>
+              </a:ext>
+            </a:extLst>
+          </p:cNvPr>
+          <p:cNvPicPr>
+            <a:picLocks noChangeAspect="1"/>
+          </p:cNvPicPr>
+          <p:nvPr/>
+        </p:nvPicPr>
+        <p:blipFill>
+          <a:blip r:embed="rId3"/>
+          <a:stretch>
+            <a:fillRect/>
+          </a:stretch>
+        </p:blipFill>
+        <p:spPr>
+          <a:xfrm>
+            <a:off x="4143840" y="1124476"/>
+            <a:ext cx="2353003" cy="2343477"/>
+          </a:xfrm>
+          <a:prstGeom prst="rect">
+            <a:avLst/>
+          </a:prstGeom>
+        </p:spPr>
+      </p:pic>
+      <p:pic>
+        <p:nvPicPr>
+          <p:cNvPr id="25" name="Kép 24">
+            <a:extLst>
+              <a:ext uri="{FF2B5EF4-FFF2-40B4-BE49-F238E27FC236}">
+                <a16:creationId xmlns:a16="http://schemas.microsoft.com/office/drawing/2014/main" id="{B84C72B2-4577-FFD1-0006-B7FC598AFE43}"/>
+              </a:ext>
+            </a:extLst>
+          </p:cNvPr>
+          <p:cNvPicPr>
+            <a:picLocks noChangeAspect="1"/>
+          </p:cNvPicPr>
+          <p:nvPr/>
+        </p:nvPicPr>
+        <p:blipFill>
+          <a:blip r:embed="rId4"/>
+          <a:stretch>
+            <a:fillRect/>
+          </a:stretch>
+        </p:blipFill>
+        <p:spPr>
+          <a:xfrm>
+            <a:off x="4143840" y="3729148"/>
+            <a:ext cx="6144482" cy="2152950"/>
+          </a:xfrm>
+          <a:prstGeom prst="rect">
+            <a:avLst/>
+          </a:prstGeom>
+        </p:spPr>
+      </p:pic>
+    </p:spTree>
+    <p:extLst>
+      <p:ext uri="{BB962C8B-B14F-4D97-AF65-F5344CB8AC3E}">
+        <p14:creationId xmlns:p14="http://schemas.microsoft.com/office/powerpoint/2010/main" val="4193024657"/>
+      </p:ext>
+    </p:extLst>
+  </p:cSld>
+  <p:clrMapOvr>
+    <a:masterClrMapping/>
+  </p:clrMapOvr>
+</p:sld>
+</file>
+
+<file path=ppt/slides/slide9.xml><?xml version="1.0" encoding="utf-8"?>
+<p:sld xmlns:a="http://schemas.openxmlformats.org/drawingml/2006/main" xmlns:r="http://schemas.openxmlformats.org/officeDocument/2006/relationships" xmlns:p="http://schemas.openxmlformats.org/presentationml/2006/main">
+  <p:cSld>
+    <p:spTree>
+      <p:nvGrpSpPr>
+        <p:cNvPr id="1" name=""/>
+        <p:cNvGrpSpPr/>
+        <p:nvPr/>
+      </p:nvGrpSpPr>
+      <p:grpSpPr>
+        <a:xfrm>
+          <a:off x="0" y="0"/>
+          <a:ext cx="0" cy="0"/>
+          <a:chOff x="0" y="0"/>
+          <a:chExt cx="0" cy="0"/>
+        </a:xfrm>
+      </p:grpSpPr>
+      <p:sp useBgFill="1">
+        <p:nvSpPr>
+          <p:cNvPr id="32" name="Rectangle 31">
+            <a:extLst>
+              <a:ext uri="{FF2B5EF4-FFF2-40B4-BE49-F238E27FC236}">
+                <a16:creationId xmlns:a16="http://schemas.microsoft.com/office/drawing/2014/main" id="{A8384FB5-9ADC-4DDC-881B-597D56F5B15D}"/>
+              </a:ext>
+              <a:ext uri="{C183D7F6-B498-43B3-948B-1728B52AA6E4}">
+                <adec:decorative xmlns:adec="http://schemas.microsoft.com/office/drawing/2017/decorative" val="1"/>
+              </a:ext>
+            </a:extLst>
+          </p:cNvPr>
+          <p:cNvSpPr>
+            <a:spLocks noGrp="1" noRot="1" noChangeAspect="1" noMove="1" noResize="1" noEditPoints="1" noAdjustHandles="1" noChangeArrowheads="1" noChangeShapeType="1" noTextEdit="1"/>
+          </p:cNvSpPr>
+          <p:nvPr>
+            <p:extLst>
+              <p:ext uri="{386F3935-93C4-4BCD-93E2-E3B085C9AB24}">
+                <p16:designElem xmlns:p16="http://schemas.microsoft.com/office/powerpoint/2015/main" val="1"/>
+              </p:ext>
+            </p:extLst>
+          </p:nvPr>
+        </p:nvSpPr>
+        <p:spPr>
+          <a:xfrm>
+            <a:off x="0" y="0"/>
+            <a:ext cx="12192000" cy="6858000"/>
+          </a:xfrm>
+          <a:prstGeom prst="rect">
+            <a:avLst/>
+          </a:prstGeom>
+          <a:ln w="12700" cap="flat" cmpd="sng" algn="ctr">
+            <a:noFill/>
+            <a:prstDash val="solid"/>
+            <a:miter lim="800000"/>
+          </a:ln>
+          <a:effectLst/>
+          <a:extLst>
+            <a:ext uri="{91240B29-F687-4F45-9708-019B960494DF}">
+              <a14:hiddenLine xmlns:a14="http://schemas.microsoft.com/office/drawing/2010/main" w="12700" cap="flat" cmpd="sng" algn="ctr">
+                <a:solidFill>
+                  <a:schemeClr val="accent1">
+                    <a:shade val="50000"/>
+                  </a:schemeClr>
+                </a:solidFill>
+                <a:prstDash val="solid"/>
+                <a:miter lim="800000"/>
+              </a14:hiddenLine>
+            </a:ext>
+          </a:extLst>
+        </p:spPr>
+        <p:style>
+          <a:lnRef idx="2">
+            <a:schemeClr val="accent1">
+              <a:shade val="50000"/>
+            </a:schemeClr>
+          </a:lnRef>
+          <a:fillRef idx="1">
+            <a:schemeClr val="accent1"/>
+          </a:fillRef>
+          <a:effectRef idx="0">
+            <a:schemeClr val="accent1"/>
+          </a:effectRef>
+          <a:fontRef idx="minor">
+            <a:schemeClr val="lt1"/>
+          </a:fontRef>
+        </p:style>
+        <p:txBody>
+          <a:bodyPr rtlCol="0" anchor="ctr"/>
+          <a:lstStyle/>
+          <a:p>
+            <a:pPr algn="ctr"/>
+            <a:endParaRPr lang="en-US"/>
+          </a:p>
+        </p:txBody>
+      </p:sp>
+      <p:sp>
+        <p:nvSpPr>
+          <p:cNvPr id="34" name="Rectangle 33">
+            <a:extLst>
+              <a:ext uri="{FF2B5EF4-FFF2-40B4-BE49-F238E27FC236}">
+                <a16:creationId xmlns:a16="http://schemas.microsoft.com/office/drawing/2014/main" id="{91E5A9A7-95C6-4F4F-B00E-C82E07FE62EF}"/>
+              </a:ext>
+              <a:ext uri="{C183D7F6-B498-43B3-948B-1728B52AA6E4}">
+                <adec:decorative xmlns:adec="http://schemas.microsoft.com/office/drawing/2017/decorative" val="1"/>
+              </a:ext>
+            </a:extLst>
+          </p:cNvPr>
+          <p:cNvSpPr>
+            <a:spLocks noGrp="1" noRot="1" noChangeAspect="1" noMove="1" noResize="1" noEditPoints="1" noAdjustHandles="1" noChangeArrowheads="1" noChangeShapeType="1" noTextEdit="1"/>
+          </p:cNvSpPr>
+          <p:nvPr>
+            <p:extLst>
+              <p:ext uri="{386F3935-93C4-4BCD-93E2-E3B085C9AB24}">
+                <p16:designElem xmlns:p16="http://schemas.microsoft.com/office/powerpoint/2015/main" val="1"/>
+              </p:ext>
+            </p:extLst>
+          </p:nvPr>
+        </p:nvSpPr>
+        <p:spPr>
+          <a:xfrm rot="5400000" flipH="1">
+            <a:off x="-1417539" y="1417538"/>
+            <a:ext cx="6875818" cy="4040744"/>
+          </a:xfrm>
+          <a:prstGeom prst="rect">
+            <a:avLst/>
+          </a:prstGeom>
+          <a:gradFill>
+            <a:gsLst>
+              <a:gs pos="0">
+                <a:srgbClr val="000000"/>
+              </a:gs>
+              <a:gs pos="100000">
+                <a:schemeClr val="accent1">
+                  <a:lumMod val="75000"/>
+                </a:schemeClr>
+              </a:gs>
+            </a:gsLst>
+            <a:lin ang="18600000" scaled="0"/>
+          </a:gradFill>
+          <a:ln>
+            <a:noFill/>
+          </a:ln>
+        </p:spPr>
+        <p:style>
+          <a:lnRef idx="2">
+            <a:schemeClr val="accent1">
+              <a:shade val="50000"/>
+            </a:schemeClr>
+          </a:lnRef>
+          <a:fillRef idx="1">
+            <a:schemeClr val="accent1"/>
+          </a:fillRef>
+          <a:effectRef idx="0">
+            <a:schemeClr val="accent1"/>
+          </a:effectRef>
+          <a:fontRef idx="minor">
+            <a:schemeClr val="lt1"/>
+          </a:fontRef>
+        </p:style>
+        <p:txBody>
+          <a:bodyPr rtlCol="0" anchor="ctr"/>
+          <a:lstStyle/>
+          <a:p>
+            <a:pPr algn="ctr"/>
+            <a:endParaRPr lang="en-US" dirty="0"/>
+          </a:p>
+        </p:txBody>
+      </p:sp>
+      <p:sp>
+        <p:nvSpPr>
+          <p:cNvPr id="36" name="Rectangle 35">
+            <a:extLst>
+              <a:ext uri="{FF2B5EF4-FFF2-40B4-BE49-F238E27FC236}">
+                <a16:creationId xmlns:a16="http://schemas.microsoft.com/office/drawing/2014/main" id="{D07DD2DE-F619-49DD-B5E7-03A290FF4ED1}"/>
+              </a:ext>
+              <a:ext uri="{C183D7F6-B498-43B3-948B-1728B52AA6E4}">
+                <adec:decorative xmlns:adec="http://schemas.microsoft.com/office/drawing/2017/decorative" val="1"/>
+              </a:ext>
+            </a:extLst>
+          </p:cNvPr>
+          <p:cNvSpPr>
+            <a:spLocks noGrp="1" noRot="1" noChangeAspect="1" noMove="1" noResize="1" noEditPoints="1" noAdjustHandles="1" noChangeArrowheads="1" noChangeShapeType="1" noTextEdit="1"/>
+          </p:cNvSpPr>
+          <p:nvPr>
+            <p:extLst>
+              <p:ext uri="{386F3935-93C4-4BCD-93E2-E3B085C9AB24}">
+                <p16:designElem xmlns:p16="http://schemas.microsoft.com/office/powerpoint/2015/main" val="1"/>
+              </p:ext>
+            </p:extLst>
+          </p:nvPr>
+        </p:nvSpPr>
+        <p:spPr>
+          <a:xfrm rot="16200000">
+            <a:off x="-158495" y="2660473"/>
+            <a:ext cx="4355594" cy="4038603"/>
+          </a:xfrm>
+          <a:prstGeom prst="rect">
+            <a:avLst/>
+          </a:prstGeom>
+          <a:gradFill>
+            <a:gsLst>
+              <a:gs pos="0">
+                <a:schemeClr val="accent1">
+                  <a:alpha val="50000"/>
+                </a:schemeClr>
+              </a:gs>
+              <a:gs pos="100000">
+                <a:schemeClr val="accent1">
+                  <a:lumMod val="50000"/>
+                  <a:alpha val="0"/>
+                </a:schemeClr>
+              </a:gs>
+            </a:gsLst>
+            <a:lin ang="11400000" scaled="0"/>
+          </a:gradFill>
+          <a:ln>
+            <a:noFill/>
+          </a:ln>
+        </p:spPr>
+        <p:style>
+          <a:lnRef idx="2">
+            <a:schemeClr val="accent1">
+              <a:shade val="50000"/>
+            </a:schemeClr>
+          </a:lnRef>
+          <a:fillRef idx="1">
+            <a:schemeClr val="accent1"/>
+          </a:fillRef>
+          <a:effectRef idx="0">
+            <a:schemeClr val="accent1"/>
+          </a:effectRef>
+          <a:fontRef idx="minor">
+            <a:schemeClr val="lt1"/>
+          </a:fontRef>
+        </p:style>
+        <p:txBody>
+          <a:bodyPr rtlCol="0" anchor="ctr"/>
+          <a:lstStyle/>
+          <a:p>
+            <a:pPr algn="ctr"/>
+            <a:endParaRPr lang="en-US"/>
+          </a:p>
+        </p:txBody>
+      </p:sp>
+      <p:sp>
+        <p:nvSpPr>
+          <p:cNvPr id="38" name="Rectangle 37">
+            <a:extLst>
+              <a:ext uri="{FF2B5EF4-FFF2-40B4-BE49-F238E27FC236}">
+                <a16:creationId xmlns:a16="http://schemas.microsoft.com/office/drawing/2014/main" id="{85149191-5F60-4A28-AAFF-039F96B0F3EC}"/>
+              </a:ext>
+              <a:ext uri="{C183D7F6-B498-43B3-948B-1728B52AA6E4}">
+                <adec:decorative xmlns:adec="http://schemas.microsoft.com/office/drawing/2017/decorative" val="1"/>
+              </a:ext>
+            </a:extLst>
+          </p:cNvPr>
+          <p:cNvSpPr>
+            <a:spLocks noGrp="1" noRot="1" noChangeAspect="1" noMove="1" noResize="1" noEditPoints="1" noAdjustHandles="1" noChangeArrowheads="1" noChangeShapeType="1" noTextEdit="1"/>
+          </p:cNvSpPr>
+          <p:nvPr>
+            <p:extLst>
+              <p:ext uri="{386F3935-93C4-4BCD-93E2-E3B085C9AB24}">
+                <p16:designElem xmlns:p16="http://schemas.microsoft.com/office/powerpoint/2015/main" val="1"/>
+              </p:ext>
+            </p:extLst>
+          </p:nvPr>
+        </p:nvSpPr>
+        <p:spPr>
+          <a:xfrm rot="16200000" flipH="1">
+            <a:off x="-1180882" y="1638085"/>
+            <a:ext cx="6857572" cy="3581401"/>
+          </a:xfrm>
+          <a:prstGeom prst="rect">
+            <a:avLst/>
+          </a:prstGeom>
+          <a:gradFill>
+            <a:gsLst>
+              <a:gs pos="0">
+                <a:srgbClr val="000000">
+                  <a:alpha val="59000"/>
+                </a:srgbClr>
+              </a:gs>
+              <a:gs pos="69000">
+                <a:schemeClr val="accent1">
+                  <a:alpha val="0"/>
+                </a:schemeClr>
+              </a:gs>
+            </a:gsLst>
+            <a:lin ang="13200000" scaled="0"/>
+          </a:gradFill>
+          <a:ln>
+            <a:noFill/>
+          </a:ln>
+        </p:spPr>
+        <p:style>
+          <a:lnRef idx="2">
+            <a:schemeClr val="accent1">
+              <a:shade val="50000"/>
+            </a:schemeClr>
+          </a:lnRef>
+          <a:fillRef idx="1">
+            <a:schemeClr val="accent1"/>
+          </a:fillRef>
+          <a:effectRef idx="0">
+            <a:schemeClr val="accent1"/>
+          </a:effectRef>
+          <a:fontRef idx="minor">
+            <a:schemeClr val="lt1"/>
+          </a:fontRef>
+        </p:style>
+        <p:txBody>
+          <a:bodyPr rtlCol="0" anchor="ctr"/>
+          <a:lstStyle/>
+          <a:p>
+            <a:pPr algn="ctr"/>
+            <a:endParaRPr lang="en-US" dirty="0"/>
+          </a:p>
+        </p:txBody>
+      </p:sp>
+      <p:sp>
+        <p:nvSpPr>
+          <p:cNvPr id="40" name="Freeform: Shape 39">
+            <a:extLst>
+              <a:ext uri="{FF2B5EF4-FFF2-40B4-BE49-F238E27FC236}">
+                <a16:creationId xmlns:a16="http://schemas.microsoft.com/office/drawing/2014/main" id="{F8260ED5-17F7-4158-B241-D51DD4CF1B7E}"/>
+              </a:ext>
+              <a:ext uri="{C183D7F6-B498-43B3-948B-1728B52AA6E4}">
+                <adec:decorative xmlns:adec="http://schemas.microsoft.com/office/drawing/2017/decorative" val="1"/>
+              </a:ext>
+            </a:extLst>
+          </p:cNvPr>
+          <p:cNvSpPr>
+            <a:spLocks noGrp="1" noRot="1" noChangeAspect="1" noMove="1" noResize="1" noEditPoints="1" noAdjustHandles="1" noChangeArrowheads="1" noChangeShapeType="1" noTextEdit="1"/>
+          </p:cNvSpPr>
+          <p:nvPr>
+            <p:extLst>
+              <p:ext uri="{386F3935-93C4-4BCD-93E2-E3B085C9AB24}">
+                <p16:designElem xmlns:p16="http://schemas.microsoft.com/office/powerpoint/2015/main" val="1"/>
+              </p:ext>
+            </p:extLst>
+          </p:nvPr>
+        </p:nvSpPr>
+        <p:spPr>
+          <a:xfrm rot="6097846">
+            <a:off x="-747355" y="1201312"/>
+            <a:ext cx="4808302" cy="4088666"/>
+          </a:xfrm>
+          <a:custGeom>
+            <a:avLst/>
+            <a:gdLst>
+              <a:gd name="connsiteX0" fmla="*/ 48844 w 4808302"/>
+              <a:gd name="connsiteY0" fmla="*/ 2888671 h 4088666"/>
+              <a:gd name="connsiteX1" fmla="*/ 0 w 4808302"/>
+              <a:gd name="connsiteY1" fmla="*/ 2404151 h 4088666"/>
+              <a:gd name="connsiteX2" fmla="*/ 2404151 w 4808302"/>
+              <a:gd name="connsiteY2" fmla="*/ 0 h 4088666"/>
+              <a:gd name="connsiteX3" fmla="*/ 4808302 w 4808302"/>
+              <a:gd name="connsiteY3" fmla="*/ 2404151 h 4088666"/>
+              <a:gd name="connsiteX4" fmla="*/ 4700216 w 4808302"/>
+              <a:gd name="connsiteY4" fmla="*/ 3119072 h 4088666"/>
+              <a:gd name="connsiteX5" fmla="*/ 4643143 w 4808302"/>
+              <a:gd name="connsiteY5" fmla="*/ 3275009 h 4088666"/>
+              <a:gd name="connsiteX6" fmla="*/ 690093 w 4808302"/>
+              <a:gd name="connsiteY6" fmla="*/ 4088666 h 4088666"/>
+              <a:gd name="connsiteX7" fmla="*/ 548991 w 4808302"/>
+              <a:gd name="connsiteY7" fmla="*/ 3933414 h 4088666"/>
+              <a:gd name="connsiteX8" fmla="*/ 48844 w 4808302"/>
+              <a:gd name="connsiteY8" fmla="*/ 2888671 h 4088666"/>
+            </a:gdLst>
+            <a:ahLst/>
+            <a:cxnLst>
+              <a:cxn ang="0">
+                <a:pos x="connsiteX0" y="connsiteY0"/>
+              </a:cxn>
+              <a:cxn ang="0">
+                <a:pos x="connsiteX1" y="connsiteY1"/>
+              </a:cxn>
+              <a:cxn ang="0">
+                <a:pos x="connsiteX2" y="connsiteY2"/>
+              </a:cxn>
+              <a:cxn ang="0">
+                <a:pos x="connsiteX3" y="connsiteY3"/>
+              </a:cxn>
+              <a:cxn ang="0">
+                <a:pos x="connsiteX4" y="connsiteY4"/>
+              </a:cxn>
+              <a:cxn ang="0">
+                <a:pos x="connsiteX5" y="connsiteY5"/>
+              </a:cxn>
+              <a:cxn ang="0">
+                <a:pos x="connsiteX6" y="connsiteY6"/>
+              </a:cxn>
+              <a:cxn ang="0">
+                <a:pos x="connsiteX7" y="connsiteY7"/>
+              </a:cxn>
+              <a:cxn ang="0">
+                <a:pos x="connsiteX8" y="connsiteY8"/>
+              </a:cxn>
+            </a:cxnLst>
+            <a:rect l="l" t="t" r="r" b="b"/>
+            <a:pathLst>
+              <a:path w="4808302" h="4088666">
+                <a:moveTo>
+                  <a:pt x="48844" y="2888671"/>
+                </a:moveTo>
+                <a:cubicBezTo>
+                  <a:pt x="16818" y="2732167"/>
+                  <a:pt x="0" y="2570123"/>
+                  <a:pt x="0" y="2404151"/>
+                </a:cubicBezTo>
+                <a:cubicBezTo>
+                  <a:pt x="0" y="1076375"/>
+                  <a:pt x="1076375" y="0"/>
+                  <a:pt x="2404151" y="0"/>
+                </a:cubicBezTo>
+                <a:cubicBezTo>
+                  <a:pt x="3731927" y="0"/>
+                  <a:pt x="4808302" y="1076375"/>
+                  <a:pt x="4808302" y="2404151"/>
+                </a:cubicBezTo>
+                <a:cubicBezTo>
+                  <a:pt x="4808302" y="2653109"/>
+                  <a:pt x="4770461" y="2893229"/>
+                  <a:pt x="4700216" y="3119072"/>
+                </a:cubicBezTo>
+                <a:lnTo>
+                  <a:pt x="4643143" y="3275009"/>
+                </a:lnTo>
+                <a:lnTo>
+                  <a:pt x="690093" y="4088666"/>
+                </a:lnTo>
+                <a:lnTo>
+                  <a:pt x="548991" y="3933414"/>
+                </a:lnTo>
+                <a:cubicBezTo>
+                  <a:pt x="304015" y="3636572"/>
+                  <a:pt x="128908" y="3279932"/>
+                  <a:pt x="48844" y="2888671"/>
+                </a:cubicBezTo>
+                <a:close/>
+              </a:path>
+            </a:pathLst>
+          </a:custGeom>
+          <a:gradFill>
+            <a:gsLst>
+              <a:gs pos="39000">
+                <a:schemeClr val="accent1">
+                  <a:lumMod val="60000"/>
+                  <a:lumOff val="40000"/>
+                  <a:alpha val="0"/>
+                </a:schemeClr>
+              </a:gs>
+              <a:gs pos="100000">
+                <a:schemeClr val="accent1">
+                  <a:lumMod val="75000"/>
+                  <a:alpha val="26000"/>
+                </a:schemeClr>
+              </a:gs>
+            </a:gsLst>
+            <a:lin ang="18600000" scaled="0"/>
+          </a:gradFill>
+          <a:ln>
+            <a:noFill/>
+          </a:ln>
+        </p:spPr>
+        <p:style>
+          <a:lnRef idx="2">
+            <a:schemeClr val="accent1">
+              <a:shade val="50000"/>
+            </a:schemeClr>
+          </a:lnRef>
+          <a:fillRef idx="1">
+            <a:schemeClr val="accent1"/>
+          </a:fillRef>
+          <a:effectRef idx="0">
+            <a:schemeClr val="accent1"/>
+          </a:effectRef>
+          <a:fontRef idx="minor">
+            <a:schemeClr val="lt1"/>
+          </a:fontRef>
+        </p:style>
+        <p:txBody>
+          <a:bodyPr wrap="square" rtlCol="0" anchor="ctr">
+            <a:noAutofit/>
+          </a:bodyPr>
+          <a:lstStyle/>
+          <a:p>
+            <a:pPr algn="ctr"/>
+            <a:endParaRPr lang="en-US" dirty="0"/>
+          </a:p>
+        </p:txBody>
+      </p:sp>
+      <p:sp>
+        <p:nvSpPr>
+          <p:cNvPr id="2" name="Cím 1">
+            <a:extLst>
+              <a:ext uri="{FF2B5EF4-FFF2-40B4-BE49-F238E27FC236}">
+                <a16:creationId xmlns:a16="http://schemas.microsoft.com/office/drawing/2014/main" id="{E618A466-3ECB-E615-898E-DF440DFB503C}"/>
+              </a:ext>
+            </a:extLst>
+          </p:cNvPr>
+          <p:cNvSpPr>
+            <a:spLocks noGrp="1"/>
+          </p:cNvSpPr>
+          <p:nvPr>
+            <p:ph type="title"/>
+          </p:nvPr>
+        </p:nvSpPr>
+        <p:spPr>
+          <a:xfrm>
+            <a:off x="660041" y="2767106"/>
+            <a:ext cx="2880828" cy="3071906"/>
+          </a:xfrm>
+        </p:spPr>
+        <p:txBody>
+          <a:bodyPr vert="horz" lIns="91440" tIns="45720" rIns="91440" bIns="45720" rtlCol="0" anchor="t">
+            <a:normAutofit/>
+          </a:bodyPr>
+          <a:lstStyle/>
+          <a:p>
+            <a:r>
               <a:rPr lang="en-US" sz="4000" kern="1200" dirty="0">
                 <a:solidFill>
                   <a:srgbClr val="FFFFFF"/>
@@ -10404,6 +11095,36 @@
           </a:p>
         </p:txBody>
       </p:sp>
+      <p:pic>
+        <p:nvPicPr>
+          <p:cNvPr id="4" name="Kép 3">
+            <a:extLst>
+              <a:ext uri="{FF2B5EF4-FFF2-40B4-BE49-F238E27FC236}">
+                <a16:creationId xmlns:a16="http://schemas.microsoft.com/office/drawing/2014/main" id="{52BE4C57-05B6-E93B-6822-E9E649B53385}"/>
+              </a:ext>
+            </a:extLst>
+          </p:cNvPr>
+          <p:cNvPicPr>
+            <a:picLocks noChangeAspect="1"/>
+          </p:cNvPicPr>
+          <p:nvPr/>
+        </p:nvPicPr>
+        <p:blipFill>
+          <a:blip r:embed="rId2"/>
+          <a:stretch>
+            <a:fillRect/>
+          </a:stretch>
+        </p:blipFill>
+        <p:spPr>
+          <a:xfrm>
+            <a:off x="4601043" y="1084425"/>
+            <a:ext cx="5801535" cy="5058481"/>
+          </a:xfrm>
+          <a:prstGeom prst="rect">
+            <a:avLst/>
+          </a:prstGeom>
+        </p:spPr>
+      </p:pic>
     </p:spTree>
     <p:extLst>
       <p:ext uri="{BB962C8B-B14F-4D97-AF65-F5344CB8AC3E}">

</xml_diff>